<commit_message>
Unsure change, but it's the latest version of the file.
</commit_message>
<xml_diff>
--- a/images/Data_transformation_workflow.pptx
+++ b/images/Data_transformation_workflow.pptx
@@ -2966,300 +2966,315 @@
           <a:chExt cx="0" cy="0"/>
         </a:xfrm>
       </p:grpSpPr>
-      <p:sp>
-        <p:nvSpPr>
-          <p:cNvPr id="4" name="TextBox 3"/>
-          <p:cNvSpPr txBox="1"/>
+      <p:grpSp>
+        <p:nvGrpSpPr>
+          <p:cNvPr id="12" name="Group 11"/>
+          <p:cNvGrpSpPr/>
           <p:nvPr/>
-        </p:nvSpPr>
-        <p:spPr>
+        </p:nvGrpSpPr>
+        <p:grpSpPr>
           <a:xfrm>
-            <a:off x="1227909" y="3091542"/>
-            <a:ext cx="553357" cy="369332"/>
+            <a:off x="1227909" y="2508068"/>
+            <a:ext cx="8994825" cy="1605950"/>
+            <a:chOff x="1227909" y="2508068"/>
+            <a:chExt cx="8994825" cy="1605950"/>
           </a:xfrm>
-          <a:prstGeom prst="rect">
-            <a:avLst/>
-          </a:prstGeom>
-          <a:noFill/>
-        </p:spPr>
-        <p:txBody>
-          <a:bodyPr wrap="none" rtlCol="0">
-            <a:spAutoFit/>
-          </a:bodyPr>
-          <a:lstStyle/>
-          <a:p>
-            <a:r>
-              <a:rPr lang="en-US" b="1" dirty="0" smtClean="0"/>
-              <a:t>MFI</a:t>
-            </a:r>
-            <a:endParaRPr lang="en-US" b="1" dirty="0"/>
-          </a:p>
-        </p:txBody>
-      </p:sp>
-      <p:sp>
-        <p:nvSpPr>
-          <p:cNvPr id="5" name="TextBox 4"/>
-          <p:cNvSpPr txBox="1"/>
-          <p:nvPr/>
-        </p:nvSpPr>
-        <p:spPr>
-          <a:xfrm>
-            <a:off x="5681465" y="3091542"/>
-            <a:ext cx="882421" cy="369332"/>
-          </a:xfrm>
-          <a:prstGeom prst="rect">
-            <a:avLst/>
-          </a:prstGeom>
-          <a:noFill/>
-        </p:spPr>
-        <p:txBody>
-          <a:bodyPr wrap="none" rtlCol="0">
-            <a:spAutoFit/>
-          </a:bodyPr>
-          <a:lstStyle/>
-          <a:p>
-            <a:r>
-              <a:rPr lang="en-US" b="1" dirty="0" smtClean="0"/>
-              <a:t>Scoring</a:t>
-            </a:r>
-            <a:endParaRPr lang="en-US" b="1" dirty="0"/>
-          </a:p>
-        </p:txBody>
-      </p:sp>
-      <p:sp>
-        <p:nvSpPr>
-          <p:cNvPr id="6" name="TextBox 5"/>
-          <p:cNvSpPr txBox="1"/>
-          <p:nvPr/>
-        </p:nvSpPr>
-        <p:spPr>
-          <a:xfrm>
-            <a:off x="8321188" y="2508068"/>
-            <a:ext cx="1901546" cy="369332"/>
-          </a:xfrm>
-          <a:prstGeom prst="rect">
-            <a:avLst/>
-          </a:prstGeom>
-          <a:noFill/>
-        </p:spPr>
-        <p:txBody>
-          <a:bodyPr wrap="none" rtlCol="0">
-            <a:spAutoFit/>
-          </a:bodyPr>
-          <a:lstStyle/>
-          <a:p>
-            <a:r>
-              <a:rPr lang="en-US" b="1" dirty="0" smtClean="0"/>
-              <a:t>Binary reactivities</a:t>
-            </a:r>
-            <a:endParaRPr lang="en-US" b="1" dirty="0"/>
-          </a:p>
-        </p:txBody>
-      </p:sp>
-      <p:sp>
-        <p:nvSpPr>
-          <p:cNvPr id="7" name="TextBox 6"/>
-          <p:cNvSpPr txBox="1"/>
-          <p:nvPr/>
-        </p:nvSpPr>
-        <p:spPr>
-          <a:xfrm>
-            <a:off x="3071569" y="3091542"/>
-            <a:ext cx="1335622" cy="369332"/>
-          </a:xfrm>
-          <a:prstGeom prst="rect">
-            <a:avLst/>
-          </a:prstGeom>
-          <a:noFill/>
-        </p:spPr>
-        <p:txBody>
-          <a:bodyPr wrap="none" rtlCol="0">
-            <a:spAutoFit/>
-          </a:bodyPr>
-          <a:lstStyle/>
-          <a:p>
-            <a:r>
-              <a:rPr lang="en-US" b="1" dirty="0" smtClean="0"/>
-              <a:t>Normalizing</a:t>
-            </a:r>
-            <a:endParaRPr lang="en-US" b="1" dirty="0"/>
-          </a:p>
-        </p:txBody>
-      </p:sp>
-      <p:sp>
-        <p:nvSpPr>
-          <p:cNvPr id="8" name="TextBox 7"/>
-          <p:cNvSpPr txBox="1"/>
-          <p:nvPr/>
-        </p:nvSpPr>
-        <p:spPr>
-          <a:xfrm>
-            <a:off x="8417881" y="3744686"/>
-            <a:ext cx="1689245" cy="369332"/>
-          </a:xfrm>
-          <a:prstGeom prst="rect">
-            <a:avLst/>
-          </a:prstGeom>
-          <a:noFill/>
-        </p:spPr>
-        <p:txBody>
-          <a:bodyPr wrap="none" rtlCol="0">
-            <a:spAutoFit/>
-          </a:bodyPr>
-          <a:lstStyle/>
-          <a:p>
-            <a:r>
-              <a:rPr lang="en-US" b="1" dirty="0" smtClean="0"/>
-              <a:t>Cutoff selection</a:t>
-            </a:r>
-            <a:endParaRPr lang="en-US" b="1" dirty="0"/>
-          </a:p>
-        </p:txBody>
-      </p:sp>
-      <p:cxnSp>
-        <p:nvCxnSpPr>
-          <p:cNvPr id="10" name="Straight Arrow Connector 9"/>
-          <p:cNvCxnSpPr>
-            <a:stCxn id="4" idx="3"/>
-            <a:endCxn id="7" idx="1"/>
-          </p:cNvCxnSpPr>
-          <p:nvPr/>
-        </p:nvCxnSpPr>
-        <p:spPr>
-          <a:xfrm>
-            <a:off x="1773251" y="3276208"/>
-            <a:ext cx="1298318" cy="0"/>
-          </a:xfrm>
-          <a:prstGeom prst="straightConnector1">
-            <a:avLst/>
-          </a:prstGeom>
-          <a:ln w="19050">
-            <a:tailEnd type="triangle"/>
-          </a:ln>
-        </p:spPr>
-        <p:style>
-          <a:lnRef idx="1">
-            <a:schemeClr val="accent1"/>
-          </a:lnRef>
-          <a:fillRef idx="0">
-            <a:schemeClr val="accent1"/>
-          </a:fillRef>
-          <a:effectRef idx="0">
-            <a:schemeClr val="accent1"/>
-          </a:effectRef>
-          <a:fontRef idx="minor">
-            <a:schemeClr val="tx1"/>
-          </a:fontRef>
-        </p:style>
-      </p:cxnSp>
-      <p:cxnSp>
-        <p:nvCxnSpPr>
-          <p:cNvPr id="13" name="Straight Arrow Connector 12"/>
-          <p:cNvCxnSpPr>
-            <a:stCxn id="7" idx="3"/>
-            <a:endCxn id="5" idx="1"/>
-          </p:cNvCxnSpPr>
-          <p:nvPr/>
-        </p:nvCxnSpPr>
-        <p:spPr>
-          <a:xfrm>
-            <a:off x="4383147" y="3276208"/>
-            <a:ext cx="1298318" cy="0"/>
-          </a:xfrm>
-          <a:prstGeom prst="straightConnector1">
-            <a:avLst/>
-          </a:prstGeom>
-          <a:ln w="19050">
-            <a:tailEnd type="triangle"/>
-          </a:ln>
-        </p:spPr>
-        <p:style>
-          <a:lnRef idx="1">
-            <a:schemeClr val="accent1"/>
-          </a:lnRef>
-          <a:fillRef idx="0">
-            <a:schemeClr val="accent1"/>
-          </a:fillRef>
-          <a:effectRef idx="0">
-            <a:schemeClr val="accent1"/>
-          </a:effectRef>
-          <a:fontRef idx="minor">
-            <a:schemeClr val="tx1"/>
-          </a:fontRef>
-        </p:style>
-      </p:cxnSp>
-      <p:cxnSp>
-        <p:nvCxnSpPr>
-          <p:cNvPr id="15" name="Straight Arrow Connector 14"/>
-          <p:cNvCxnSpPr>
-            <a:stCxn id="5" idx="3"/>
-            <a:endCxn id="6" idx="1"/>
-          </p:cNvCxnSpPr>
-          <p:nvPr/>
-        </p:nvCxnSpPr>
-        <p:spPr>
-          <a:xfrm flipV="1">
-            <a:off x="6563886" y="2692734"/>
-            <a:ext cx="1757302" cy="583474"/>
-          </a:xfrm>
-          <a:prstGeom prst="straightConnector1">
-            <a:avLst/>
-          </a:prstGeom>
-          <a:ln w="19050">
-            <a:tailEnd type="triangle"/>
-          </a:ln>
-        </p:spPr>
-        <p:style>
-          <a:lnRef idx="1">
-            <a:schemeClr val="accent1"/>
-          </a:lnRef>
-          <a:fillRef idx="0">
-            <a:schemeClr val="accent1"/>
-          </a:fillRef>
-          <a:effectRef idx="0">
-            <a:schemeClr val="accent1"/>
-          </a:effectRef>
-          <a:fontRef idx="minor">
-            <a:schemeClr val="tx1"/>
-          </a:fontRef>
-        </p:style>
-      </p:cxnSp>
-      <p:cxnSp>
-        <p:nvCxnSpPr>
-          <p:cNvPr id="17" name="Straight Arrow Connector 16"/>
-          <p:cNvCxnSpPr>
-            <a:stCxn id="5" idx="3"/>
-            <a:endCxn id="8" idx="1"/>
-          </p:cNvCxnSpPr>
-          <p:nvPr/>
-        </p:nvCxnSpPr>
-        <p:spPr>
-          <a:xfrm>
-            <a:off x="6563886" y="3276208"/>
-            <a:ext cx="1853995" cy="653144"/>
-          </a:xfrm>
-          <a:prstGeom prst="straightConnector1">
-            <a:avLst/>
-          </a:prstGeom>
-          <a:ln w="19050">
-            <a:tailEnd type="triangle"/>
-          </a:ln>
-        </p:spPr>
-        <p:style>
-          <a:lnRef idx="1">
-            <a:schemeClr val="accent1"/>
-          </a:lnRef>
-          <a:fillRef idx="0">
-            <a:schemeClr val="accent1"/>
-          </a:fillRef>
-          <a:effectRef idx="0">
-            <a:schemeClr val="accent1"/>
-          </a:effectRef>
-          <a:fontRef idx="minor">
-            <a:schemeClr val="tx1"/>
-          </a:fontRef>
-        </p:style>
-      </p:cxnSp>
+        </p:grpSpPr>
+        <p:sp>
+          <p:nvSpPr>
+            <p:cNvPr id="4" name="TextBox 3"/>
+            <p:cNvSpPr txBox="1"/>
+            <p:nvPr/>
+          </p:nvSpPr>
+          <p:spPr>
+            <a:xfrm>
+              <a:off x="1227909" y="3091542"/>
+              <a:ext cx="553357" cy="369332"/>
+            </a:xfrm>
+            <a:prstGeom prst="rect">
+              <a:avLst/>
+            </a:prstGeom>
+            <a:noFill/>
+          </p:spPr>
+          <p:txBody>
+            <a:bodyPr wrap="none" rtlCol="0">
+              <a:spAutoFit/>
+            </a:bodyPr>
+            <a:lstStyle/>
+            <a:p>
+              <a:r>
+                <a:rPr lang="en-US" b="1" dirty="0" smtClean="0"/>
+                <a:t>MFI</a:t>
+              </a:r>
+              <a:endParaRPr lang="en-US" b="1" dirty="0"/>
+            </a:p>
+          </p:txBody>
+        </p:sp>
+        <p:sp>
+          <p:nvSpPr>
+            <p:cNvPr id="5" name="TextBox 4"/>
+            <p:cNvSpPr txBox="1"/>
+            <p:nvPr/>
+          </p:nvSpPr>
+          <p:spPr>
+            <a:xfrm>
+              <a:off x="5681465" y="3091542"/>
+              <a:ext cx="882421" cy="369332"/>
+            </a:xfrm>
+            <a:prstGeom prst="rect">
+              <a:avLst/>
+            </a:prstGeom>
+            <a:noFill/>
+          </p:spPr>
+          <p:txBody>
+            <a:bodyPr wrap="none" rtlCol="0">
+              <a:spAutoFit/>
+            </a:bodyPr>
+            <a:lstStyle/>
+            <a:p>
+              <a:r>
+                <a:rPr lang="en-US" b="1" dirty="0" smtClean="0"/>
+                <a:t>Scoring</a:t>
+              </a:r>
+              <a:endParaRPr lang="en-US" b="1" dirty="0"/>
+            </a:p>
+          </p:txBody>
+        </p:sp>
+        <p:sp>
+          <p:nvSpPr>
+            <p:cNvPr id="6" name="TextBox 5"/>
+            <p:cNvSpPr txBox="1"/>
+            <p:nvPr/>
+          </p:nvSpPr>
+          <p:spPr>
+            <a:xfrm>
+              <a:off x="8321188" y="2508068"/>
+              <a:ext cx="1901546" cy="369332"/>
+            </a:xfrm>
+            <a:prstGeom prst="rect">
+              <a:avLst/>
+            </a:prstGeom>
+            <a:noFill/>
+          </p:spPr>
+          <p:txBody>
+            <a:bodyPr wrap="none" rtlCol="0">
+              <a:spAutoFit/>
+            </a:bodyPr>
+            <a:lstStyle/>
+            <a:p>
+              <a:r>
+                <a:rPr lang="en-US" b="1" dirty="0" smtClean="0"/>
+                <a:t>Binary reactivities</a:t>
+              </a:r>
+              <a:endParaRPr lang="en-US" b="1" dirty="0"/>
+            </a:p>
+          </p:txBody>
+        </p:sp>
+        <p:sp>
+          <p:nvSpPr>
+            <p:cNvPr id="7" name="TextBox 6"/>
+            <p:cNvSpPr txBox="1"/>
+            <p:nvPr/>
+          </p:nvSpPr>
+          <p:spPr>
+            <a:xfrm>
+              <a:off x="3071569" y="3091542"/>
+              <a:ext cx="1335622" cy="369332"/>
+            </a:xfrm>
+            <a:prstGeom prst="rect">
+              <a:avLst/>
+            </a:prstGeom>
+            <a:noFill/>
+          </p:spPr>
+          <p:txBody>
+            <a:bodyPr wrap="none" rtlCol="0">
+              <a:spAutoFit/>
+            </a:bodyPr>
+            <a:lstStyle/>
+            <a:p>
+              <a:r>
+                <a:rPr lang="en-US" b="1" dirty="0" smtClean="0"/>
+                <a:t>Normalizing</a:t>
+              </a:r>
+              <a:endParaRPr lang="en-US" b="1" dirty="0"/>
+            </a:p>
+          </p:txBody>
+        </p:sp>
+        <p:sp>
+          <p:nvSpPr>
+            <p:cNvPr id="8" name="TextBox 7"/>
+            <p:cNvSpPr txBox="1"/>
+            <p:nvPr/>
+          </p:nvSpPr>
+          <p:spPr>
+            <a:xfrm>
+              <a:off x="8417881" y="3744686"/>
+              <a:ext cx="1689245" cy="369332"/>
+            </a:xfrm>
+            <a:prstGeom prst="rect">
+              <a:avLst/>
+            </a:prstGeom>
+            <a:noFill/>
+          </p:spPr>
+          <p:txBody>
+            <a:bodyPr wrap="none" rtlCol="0">
+              <a:spAutoFit/>
+            </a:bodyPr>
+            <a:lstStyle/>
+            <a:p>
+              <a:r>
+                <a:rPr lang="en-US" b="1" dirty="0" smtClean="0"/>
+                <a:t>Cutoff selection</a:t>
+              </a:r>
+              <a:endParaRPr lang="en-US" b="1" dirty="0"/>
+            </a:p>
+          </p:txBody>
+        </p:sp>
+        <p:cxnSp>
+          <p:nvCxnSpPr>
+            <p:cNvPr id="10" name="Straight Arrow Connector 9"/>
+            <p:cNvCxnSpPr>
+              <a:stCxn id="4" idx="3"/>
+              <a:endCxn id="7" idx="1"/>
+            </p:cNvCxnSpPr>
+            <p:nvPr/>
+          </p:nvCxnSpPr>
+          <p:spPr>
+            <a:xfrm>
+              <a:off x="1773251" y="3276208"/>
+              <a:ext cx="1298318" cy="0"/>
+            </a:xfrm>
+            <a:prstGeom prst="straightConnector1">
+              <a:avLst/>
+            </a:prstGeom>
+            <a:ln w="19050">
+              <a:tailEnd type="triangle"/>
+            </a:ln>
+          </p:spPr>
+          <p:style>
+            <a:lnRef idx="1">
+              <a:schemeClr val="accent1"/>
+            </a:lnRef>
+            <a:fillRef idx="0">
+              <a:schemeClr val="accent1"/>
+            </a:fillRef>
+            <a:effectRef idx="0">
+              <a:schemeClr val="accent1"/>
+            </a:effectRef>
+            <a:fontRef idx="minor">
+              <a:schemeClr val="tx1"/>
+            </a:fontRef>
+          </p:style>
+        </p:cxnSp>
+        <p:cxnSp>
+          <p:nvCxnSpPr>
+            <p:cNvPr id="13" name="Straight Arrow Connector 12"/>
+            <p:cNvCxnSpPr>
+              <a:stCxn id="7" idx="3"/>
+              <a:endCxn id="5" idx="1"/>
+            </p:cNvCxnSpPr>
+            <p:nvPr/>
+          </p:nvCxnSpPr>
+          <p:spPr>
+            <a:xfrm>
+              <a:off x="4383147" y="3276208"/>
+              <a:ext cx="1298318" cy="0"/>
+            </a:xfrm>
+            <a:prstGeom prst="straightConnector1">
+              <a:avLst/>
+            </a:prstGeom>
+            <a:ln w="19050">
+              <a:tailEnd type="triangle"/>
+            </a:ln>
+          </p:spPr>
+          <p:style>
+            <a:lnRef idx="1">
+              <a:schemeClr val="accent1"/>
+            </a:lnRef>
+            <a:fillRef idx="0">
+              <a:schemeClr val="accent1"/>
+            </a:fillRef>
+            <a:effectRef idx="0">
+              <a:schemeClr val="accent1"/>
+            </a:effectRef>
+            <a:fontRef idx="minor">
+              <a:schemeClr val="tx1"/>
+            </a:fontRef>
+          </p:style>
+        </p:cxnSp>
+        <p:cxnSp>
+          <p:nvCxnSpPr>
+            <p:cNvPr id="15" name="Straight Arrow Connector 14"/>
+            <p:cNvCxnSpPr>
+              <a:stCxn id="5" idx="3"/>
+              <a:endCxn id="6" idx="1"/>
+            </p:cNvCxnSpPr>
+            <p:nvPr/>
+          </p:nvCxnSpPr>
+          <p:spPr>
+            <a:xfrm flipV="1">
+              <a:off x="6563886" y="2692734"/>
+              <a:ext cx="1757302" cy="583474"/>
+            </a:xfrm>
+            <a:prstGeom prst="straightConnector1">
+              <a:avLst/>
+            </a:prstGeom>
+            <a:ln w="19050">
+              <a:tailEnd type="triangle"/>
+            </a:ln>
+          </p:spPr>
+          <p:style>
+            <a:lnRef idx="1">
+              <a:schemeClr val="accent1"/>
+            </a:lnRef>
+            <a:fillRef idx="0">
+              <a:schemeClr val="accent1"/>
+            </a:fillRef>
+            <a:effectRef idx="0">
+              <a:schemeClr val="accent1"/>
+            </a:effectRef>
+            <a:fontRef idx="minor">
+              <a:schemeClr val="tx1"/>
+            </a:fontRef>
+          </p:style>
+        </p:cxnSp>
+        <p:cxnSp>
+          <p:nvCxnSpPr>
+            <p:cNvPr id="17" name="Straight Arrow Connector 16"/>
+            <p:cNvCxnSpPr>
+              <a:stCxn id="5" idx="3"/>
+              <a:endCxn id="8" idx="1"/>
+            </p:cNvCxnSpPr>
+            <p:nvPr/>
+          </p:nvCxnSpPr>
+          <p:spPr>
+            <a:xfrm>
+              <a:off x="6563886" y="3276208"/>
+              <a:ext cx="1853995" cy="653144"/>
+            </a:xfrm>
+            <a:prstGeom prst="straightConnector1">
+              <a:avLst/>
+            </a:prstGeom>
+            <a:ln w="19050">
+              <a:tailEnd type="triangle"/>
+            </a:ln>
+          </p:spPr>
+          <p:style>
+            <a:lnRef idx="1">
+              <a:schemeClr val="accent1"/>
+            </a:lnRef>
+            <a:fillRef idx="0">
+              <a:schemeClr val="accent1"/>
+            </a:fillRef>
+            <a:effectRef idx="0">
+              <a:schemeClr val="accent1"/>
+            </a:effectRef>
+            <a:fontRef idx="minor">
+              <a:schemeClr val="tx1"/>
+            </a:fontRef>
+          </p:style>
+        </p:cxnSp>
+      </p:grpSp>
     </p:spTree>
     <p:extLst>
       <p:ext uri="{BB962C8B-B14F-4D97-AF65-F5344CB8AC3E}">
@@ -3290,518 +3305,533 @@
           <a:chExt cx="0" cy="0"/>
         </a:xfrm>
       </p:grpSpPr>
-      <p:sp>
-        <p:nvSpPr>
-          <p:cNvPr id="4" name="TextBox 3"/>
-          <p:cNvSpPr txBox="1"/>
+      <p:grpSp>
+        <p:nvGrpSpPr>
+          <p:cNvPr id="12" name="Group 11"/>
+          <p:cNvGrpSpPr/>
           <p:nvPr/>
-        </p:nvSpPr>
-        <p:spPr>
+        </p:nvGrpSpPr>
+        <p:grpSpPr>
           <a:xfrm>
-            <a:off x="1227909" y="3091542"/>
-            <a:ext cx="553357" cy="369332"/>
+            <a:off x="1227909" y="2508068"/>
+            <a:ext cx="8994825" cy="1605950"/>
+            <a:chOff x="1227909" y="2508068"/>
+            <a:chExt cx="8994825" cy="1605950"/>
           </a:xfrm>
-          <a:prstGeom prst="rect">
-            <a:avLst/>
-          </a:prstGeom>
-          <a:noFill/>
-        </p:spPr>
-        <p:txBody>
-          <a:bodyPr wrap="none" rtlCol="0">
-            <a:spAutoFit/>
-          </a:bodyPr>
-          <a:lstStyle/>
-          <a:p>
-            <a:r>
-              <a:rPr lang="en-US" b="1" dirty="0" smtClean="0"/>
-              <a:t>MFI</a:t>
-            </a:r>
-            <a:endParaRPr lang="en-US" b="1" dirty="0"/>
-          </a:p>
-        </p:txBody>
-      </p:sp>
-      <p:sp>
-        <p:nvSpPr>
-          <p:cNvPr id="5" name="TextBox 4"/>
-          <p:cNvSpPr txBox="1"/>
-          <p:nvPr/>
-        </p:nvSpPr>
-        <p:spPr>
-          <a:xfrm>
-            <a:off x="5681465" y="3091542"/>
-            <a:ext cx="882421" cy="369332"/>
-          </a:xfrm>
-          <a:prstGeom prst="rect">
-            <a:avLst/>
-          </a:prstGeom>
-          <a:noFill/>
-        </p:spPr>
-        <p:txBody>
-          <a:bodyPr wrap="none" rtlCol="0">
-            <a:spAutoFit/>
-          </a:bodyPr>
-          <a:lstStyle/>
-          <a:p>
-            <a:r>
-              <a:rPr lang="en-US" b="1" dirty="0" smtClean="0"/>
-              <a:t>Scoring</a:t>
-            </a:r>
-            <a:endParaRPr lang="en-US" b="1" dirty="0"/>
-          </a:p>
-        </p:txBody>
-      </p:sp>
-      <p:sp>
-        <p:nvSpPr>
-          <p:cNvPr id="6" name="TextBox 5"/>
-          <p:cNvSpPr txBox="1"/>
-          <p:nvPr/>
-        </p:nvSpPr>
-        <p:spPr>
-          <a:xfrm>
-            <a:off x="8321188" y="2508068"/>
-            <a:ext cx="1901546" cy="369332"/>
-          </a:xfrm>
-          <a:prstGeom prst="rect">
-            <a:avLst/>
-          </a:prstGeom>
-          <a:noFill/>
-        </p:spPr>
-        <p:txBody>
-          <a:bodyPr wrap="none" rtlCol="0">
-            <a:spAutoFit/>
-          </a:bodyPr>
-          <a:lstStyle/>
-          <a:p>
-            <a:r>
-              <a:rPr lang="en-US" b="1" dirty="0" smtClean="0"/>
-              <a:t>Binary reactivities</a:t>
-            </a:r>
-            <a:endParaRPr lang="en-US" b="1" dirty="0"/>
-          </a:p>
-        </p:txBody>
-      </p:sp>
-      <p:sp>
-        <p:nvSpPr>
-          <p:cNvPr id="7" name="TextBox 6"/>
-          <p:cNvSpPr txBox="1"/>
-          <p:nvPr/>
-        </p:nvSpPr>
-        <p:spPr>
-          <a:xfrm>
-            <a:off x="3071569" y="3091542"/>
-            <a:ext cx="1335622" cy="369332"/>
-          </a:xfrm>
-          <a:prstGeom prst="rect">
-            <a:avLst/>
-          </a:prstGeom>
-          <a:noFill/>
-        </p:spPr>
-        <p:txBody>
-          <a:bodyPr wrap="none" rtlCol="0">
-            <a:spAutoFit/>
-          </a:bodyPr>
-          <a:lstStyle/>
-          <a:p>
-            <a:r>
-              <a:rPr lang="en-US" b="1" dirty="0" smtClean="0"/>
-              <a:t>Normalizing</a:t>
-            </a:r>
-            <a:endParaRPr lang="en-US" b="1" dirty="0"/>
-          </a:p>
-        </p:txBody>
-      </p:sp>
-      <p:sp>
-        <p:nvSpPr>
-          <p:cNvPr id="8" name="TextBox 7"/>
-          <p:cNvSpPr txBox="1"/>
-          <p:nvPr/>
-        </p:nvSpPr>
-        <p:spPr>
-          <a:xfrm>
-            <a:off x="8417881" y="3744686"/>
-            <a:ext cx="1689245" cy="369332"/>
-          </a:xfrm>
-          <a:prstGeom prst="rect">
-            <a:avLst/>
-          </a:prstGeom>
-          <a:noFill/>
-        </p:spPr>
-        <p:txBody>
-          <a:bodyPr wrap="none" rtlCol="0">
-            <a:spAutoFit/>
-          </a:bodyPr>
-          <a:lstStyle/>
-          <a:p>
-            <a:r>
-              <a:rPr lang="en-US" b="1" dirty="0" smtClean="0"/>
-              <a:t>Cutoff selection</a:t>
-            </a:r>
-            <a:endParaRPr lang="en-US" b="1" dirty="0"/>
-          </a:p>
-        </p:txBody>
-      </p:sp>
-      <p:cxnSp>
-        <p:nvCxnSpPr>
-          <p:cNvPr id="10" name="Straight Arrow Connector 9"/>
-          <p:cNvCxnSpPr>
-            <a:stCxn id="4" idx="3"/>
-            <a:endCxn id="7" idx="1"/>
-          </p:cNvCxnSpPr>
-          <p:nvPr/>
-        </p:nvCxnSpPr>
-        <p:spPr>
-          <a:xfrm>
-            <a:off x="1773251" y="3276208"/>
-            <a:ext cx="1298318" cy="0"/>
-          </a:xfrm>
-          <a:prstGeom prst="straightConnector1">
-            <a:avLst/>
-          </a:prstGeom>
-          <a:ln w="19050">
-            <a:tailEnd type="triangle"/>
-          </a:ln>
-        </p:spPr>
-        <p:style>
-          <a:lnRef idx="1">
-            <a:schemeClr val="accent1"/>
-          </a:lnRef>
-          <a:fillRef idx="0">
-            <a:schemeClr val="accent1"/>
-          </a:fillRef>
-          <a:effectRef idx="0">
-            <a:schemeClr val="accent1"/>
-          </a:effectRef>
-          <a:fontRef idx="minor">
-            <a:schemeClr val="tx1"/>
-          </a:fontRef>
-        </p:style>
-      </p:cxnSp>
-      <p:cxnSp>
-        <p:nvCxnSpPr>
-          <p:cNvPr id="13" name="Straight Arrow Connector 12"/>
-          <p:cNvCxnSpPr>
-            <a:stCxn id="7" idx="3"/>
-            <a:endCxn id="5" idx="1"/>
-          </p:cNvCxnSpPr>
-          <p:nvPr/>
-        </p:nvCxnSpPr>
-        <p:spPr>
-          <a:xfrm>
-            <a:off x="4383147" y="3276208"/>
-            <a:ext cx="1298318" cy="0"/>
-          </a:xfrm>
-          <a:prstGeom prst="straightConnector1">
-            <a:avLst/>
-          </a:prstGeom>
-          <a:ln w="19050">
-            <a:tailEnd type="triangle"/>
-          </a:ln>
-        </p:spPr>
-        <p:style>
-          <a:lnRef idx="1">
-            <a:schemeClr val="accent1"/>
-          </a:lnRef>
-          <a:fillRef idx="0">
-            <a:schemeClr val="accent1"/>
-          </a:fillRef>
-          <a:effectRef idx="0">
-            <a:schemeClr val="accent1"/>
-          </a:effectRef>
-          <a:fontRef idx="minor">
-            <a:schemeClr val="tx1"/>
-          </a:fontRef>
-        </p:style>
-      </p:cxnSp>
-      <p:cxnSp>
-        <p:nvCxnSpPr>
-          <p:cNvPr id="15" name="Straight Arrow Connector 14"/>
-          <p:cNvCxnSpPr>
-            <a:stCxn id="5" idx="3"/>
-            <a:endCxn id="6" idx="1"/>
-          </p:cNvCxnSpPr>
-          <p:nvPr/>
-        </p:nvCxnSpPr>
-        <p:spPr>
-          <a:xfrm flipV="1">
-            <a:off x="6563886" y="2692734"/>
-            <a:ext cx="1757302" cy="583474"/>
-          </a:xfrm>
-          <a:prstGeom prst="straightConnector1">
-            <a:avLst/>
-          </a:prstGeom>
-          <a:ln w="19050">
-            <a:tailEnd type="triangle"/>
-          </a:ln>
-        </p:spPr>
-        <p:style>
-          <a:lnRef idx="1">
-            <a:schemeClr val="accent1"/>
-          </a:lnRef>
-          <a:fillRef idx="0">
-            <a:schemeClr val="accent1"/>
-          </a:fillRef>
-          <a:effectRef idx="0">
-            <a:schemeClr val="accent1"/>
-          </a:effectRef>
-          <a:fontRef idx="minor">
-            <a:schemeClr val="tx1"/>
-          </a:fontRef>
-        </p:style>
-      </p:cxnSp>
-      <p:cxnSp>
-        <p:nvCxnSpPr>
-          <p:cNvPr id="17" name="Straight Arrow Connector 16"/>
-          <p:cNvCxnSpPr>
-            <a:stCxn id="5" idx="3"/>
-            <a:endCxn id="8" idx="1"/>
-          </p:cNvCxnSpPr>
-          <p:nvPr/>
-        </p:nvCxnSpPr>
-        <p:spPr>
-          <a:xfrm>
-            <a:off x="6563886" y="3276208"/>
-            <a:ext cx="1853995" cy="653144"/>
-          </a:xfrm>
-          <a:prstGeom prst="straightConnector1">
-            <a:avLst/>
-          </a:prstGeom>
-          <a:ln w="19050">
-            <a:tailEnd type="triangle"/>
-          </a:ln>
-        </p:spPr>
-        <p:style>
-          <a:lnRef idx="1">
-            <a:schemeClr val="accent1"/>
-          </a:lnRef>
-          <a:fillRef idx="0">
-            <a:schemeClr val="accent1"/>
-          </a:fillRef>
-          <a:effectRef idx="0">
-            <a:schemeClr val="accent1"/>
-          </a:effectRef>
-          <a:fontRef idx="minor">
-            <a:schemeClr val="tx1"/>
-          </a:fontRef>
-        </p:style>
-      </p:cxnSp>
-      <p:sp>
-        <p:nvSpPr>
-          <p:cNvPr id="2" name="TextBox 1"/>
-          <p:cNvSpPr txBox="1"/>
-          <p:nvPr/>
-        </p:nvSpPr>
-        <p:spPr>
-          <a:xfrm>
-            <a:off x="1832344" y="2877400"/>
-            <a:ext cx="1180131" cy="369332"/>
-          </a:xfrm>
-          <a:prstGeom prst="rect">
-            <a:avLst/>
-          </a:prstGeom>
-          <a:noFill/>
-        </p:spPr>
-        <p:txBody>
-          <a:bodyPr wrap="none" rtlCol="0">
-            <a:spAutoFit/>
-          </a:bodyPr>
-          <a:lstStyle/>
-          <a:p>
-            <a:r>
-              <a:rPr lang="en-US" dirty="0" err="1">
+        </p:grpSpPr>
+        <p:sp>
+          <p:nvSpPr>
+            <p:cNvPr id="4" name="TextBox 3"/>
+            <p:cNvSpPr txBox="1"/>
+            <p:nvPr/>
+          </p:nvSpPr>
+          <p:spPr>
+            <a:xfrm>
+              <a:off x="1227909" y="3091542"/>
+              <a:ext cx="553357" cy="369332"/>
+            </a:xfrm>
+            <a:prstGeom prst="rect">
+              <a:avLst/>
+            </a:prstGeom>
+            <a:noFill/>
+          </p:spPr>
+          <p:txBody>
+            <a:bodyPr wrap="none" rtlCol="0">
+              <a:spAutoFit/>
+            </a:bodyPr>
+            <a:lstStyle/>
+            <a:p>
+              <a:r>
+                <a:rPr lang="en-US" b="1" dirty="0" smtClean="0"/>
+                <a:t>MFI</a:t>
+              </a:r>
+              <a:endParaRPr lang="en-US" b="1" dirty="0"/>
+            </a:p>
+          </p:txBody>
+        </p:sp>
+        <p:sp>
+          <p:nvSpPr>
+            <p:cNvPr id="5" name="TextBox 4"/>
+            <p:cNvSpPr txBox="1"/>
+            <p:nvPr/>
+          </p:nvSpPr>
+          <p:spPr>
+            <a:xfrm>
+              <a:off x="5681465" y="3091542"/>
+              <a:ext cx="882421" cy="369332"/>
+            </a:xfrm>
+            <a:prstGeom prst="rect">
+              <a:avLst/>
+            </a:prstGeom>
+            <a:noFill/>
+          </p:spPr>
+          <p:txBody>
+            <a:bodyPr wrap="none" rtlCol="0">
+              <a:spAutoFit/>
+            </a:bodyPr>
+            <a:lstStyle/>
+            <a:p>
+              <a:r>
+                <a:rPr lang="en-US" b="1" dirty="0" smtClean="0"/>
+                <a:t>Scoring</a:t>
+              </a:r>
+              <a:endParaRPr lang="en-US" b="1" dirty="0"/>
+            </a:p>
+          </p:txBody>
+        </p:sp>
+        <p:sp>
+          <p:nvSpPr>
+            <p:cNvPr id="6" name="TextBox 5"/>
+            <p:cNvSpPr txBox="1"/>
+            <p:nvPr/>
+          </p:nvSpPr>
+          <p:spPr>
+            <a:xfrm>
+              <a:off x="8321188" y="2508068"/>
+              <a:ext cx="1901546" cy="369332"/>
+            </a:xfrm>
+            <a:prstGeom prst="rect">
+              <a:avLst/>
+            </a:prstGeom>
+            <a:noFill/>
+          </p:spPr>
+          <p:txBody>
+            <a:bodyPr wrap="none" rtlCol="0">
+              <a:spAutoFit/>
+            </a:bodyPr>
+            <a:lstStyle/>
+            <a:p>
+              <a:r>
+                <a:rPr lang="en-US" b="1" dirty="0" smtClean="0"/>
+                <a:t>Binary reactivities</a:t>
+              </a:r>
+              <a:endParaRPr lang="en-US" b="1" dirty="0"/>
+            </a:p>
+          </p:txBody>
+        </p:sp>
+        <p:sp>
+          <p:nvSpPr>
+            <p:cNvPr id="7" name="TextBox 6"/>
+            <p:cNvSpPr txBox="1"/>
+            <p:nvPr/>
+          </p:nvSpPr>
+          <p:spPr>
+            <a:xfrm>
+              <a:off x="3071569" y="3091542"/>
+              <a:ext cx="1335622" cy="369332"/>
+            </a:xfrm>
+            <a:prstGeom prst="rect">
+              <a:avLst/>
+            </a:prstGeom>
+            <a:noFill/>
+          </p:spPr>
+          <p:txBody>
+            <a:bodyPr wrap="none" rtlCol="0">
+              <a:spAutoFit/>
+            </a:bodyPr>
+            <a:lstStyle/>
+            <a:p>
+              <a:r>
+                <a:rPr lang="en-US" b="1" dirty="0" smtClean="0"/>
+                <a:t>Normalizing</a:t>
+              </a:r>
+              <a:endParaRPr lang="en-US" b="1" dirty="0"/>
+            </a:p>
+          </p:txBody>
+        </p:sp>
+        <p:sp>
+          <p:nvSpPr>
+            <p:cNvPr id="8" name="TextBox 7"/>
+            <p:cNvSpPr txBox="1"/>
+            <p:nvPr/>
+          </p:nvSpPr>
+          <p:spPr>
+            <a:xfrm>
+              <a:off x="8417881" y="3744686"/>
+              <a:ext cx="1689245" cy="369332"/>
+            </a:xfrm>
+            <a:prstGeom prst="rect">
+              <a:avLst/>
+            </a:prstGeom>
+            <a:noFill/>
+          </p:spPr>
+          <p:txBody>
+            <a:bodyPr wrap="none" rtlCol="0">
+              <a:spAutoFit/>
+            </a:bodyPr>
+            <a:lstStyle/>
+            <a:p>
+              <a:r>
+                <a:rPr lang="en-US" b="1" dirty="0" smtClean="0"/>
+                <a:t>Cutoff selection</a:t>
+              </a:r>
+              <a:endParaRPr lang="en-US" b="1" dirty="0"/>
+            </a:p>
+          </p:txBody>
+        </p:sp>
+        <p:cxnSp>
+          <p:nvCxnSpPr>
+            <p:cNvPr id="10" name="Straight Arrow Connector 9"/>
+            <p:cNvCxnSpPr>
+              <a:stCxn id="4" idx="3"/>
+              <a:endCxn id="7" idx="1"/>
+            </p:cNvCxnSpPr>
+            <p:nvPr/>
+          </p:nvCxnSpPr>
+          <p:spPr>
+            <a:xfrm>
+              <a:off x="1773251" y="3276208"/>
+              <a:ext cx="1298318" cy="0"/>
+            </a:xfrm>
+            <a:prstGeom prst="straightConnector1">
+              <a:avLst/>
+            </a:prstGeom>
+            <a:ln w="19050">
+              <a:tailEnd type="triangle"/>
+            </a:ln>
+          </p:spPr>
+          <p:style>
+            <a:lnRef idx="1">
+              <a:schemeClr val="accent1"/>
+            </a:lnRef>
+            <a:fillRef idx="0">
+              <a:schemeClr val="accent1"/>
+            </a:fillRef>
+            <a:effectRef idx="0">
+              <a:schemeClr val="accent1"/>
+            </a:effectRef>
+            <a:fontRef idx="minor">
+              <a:schemeClr val="tx1"/>
+            </a:fontRef>
+          </p:style>
+        </p:cxnSp>
+        <p:cxnSp>
+          <p:nvCxnSpPr>
+            <p:cNvPr id="13" name="Straight Arrow Connector 12"/>
+            <p:cNvCxnSpPr>
+              <a:stCxn id="7" idx="3"/>
+              <a:endCxn id="5" idx="1"/>
+            </p:cNvCxnSpPr>
+            <p:nvPr/>
+          </p:nvCxnSpPr>
+          <p:spPr>
+            <a:xfrm>
+              <a:off x="4383147" y="3276208"/>
+              <a:ext cx="1298318" cy="0"/>
+            </a:xfrm>
+            <a:prstGeom prst="straightConnector1">
+              <a:avLst/>
+            </a:prstGeom>
+            <a:ln w="19050">
+              <a:tailEnd type="triangle"/>
+            </a:ln>
+          </p:spPr>
+          <p:style>
+            <a:lnRef idx="1">
+              <a:schemeClr val="accent1"/>
+            </a:lnRef>
+            <a:fillRef idx="0">
+              <a:schemeClr val="accent1"/>
+            </a:fillRef>
+            <a:effectRef idx="0">
+              <a:schemeClr val="accent1"/>
+            </a:effectRef>
+            <a:fontRef idx="minor">
+              <a:schemeClr val="tx1"/>
+            </a:fontRef>
+          </p:style>
+        </p:cxnSp>
+        <p:cxnSp>
+          <p:nvCxnSpPr>
+            <p:cNvPr id="15" name="Straight Arrow Connector 14"/>
+            <p:cNvCxnSpPr>
+              <a:stCxn id="5" idx="3"/>
+              <a:endCxn id="6" idx="1"/>
+            </p:cNvCxnSpPr>
+            <p:nvPr/>
+          </p:nvCxnSpPr>
+          <p:spPr>
+            <a:xfrm flipV="1">
+              <a:off x="6563886" y="2692734"/>
+              <a:ext cx="1757302" cy="583474"/>
+            </a:xfrm>
+            <a:prstGeom prst="straightConnector1">
+              <a:avLst/>
+            </a:prstGeom>
+            <a:ln w="19050">
+              <a:tailEnd type="triangle"/>
+            </a:ln>
+          </p:spPr>
+          <p:style>
+            <a:lnRef idx="1">
+              <a:schemeClr val="accent1"/>
+            </a:lnRef>
+            <a:fillRef idx="0">
+              <a:schemeClr val="accent1"/>
+            </a:fillRef>
+            <a:effectRef idx="0">
+              <a:schemeClr val="accent1"/>
+            </a:effectRef>
+            <a:fontRef idx="minor">
+              <a:schemeClr val="tx1"/>
+            </a:fontRef>
+          </p:style>
+        </p:cxnSp>
+        <p:cxnSp>
+          <p:nvCxnSpPr>
+            <p:cNvPr id="17" name="Straight Arrow Connector 16"/>
+            <p:cNvCxnSpPr>
+              <a:stCxn id="5" idx="3"/>
+              <a:endCxn id="8" idx="1"/>
+            </p:cNvCxnSpPr>
+            <p:nvPr/>
+          </p:nvCxnSpPr>
+          <p:spPr>
+            <a:xfrm>
+              <a:off x="6563886" y="3276208"/>
+              <a:ext cx="1853995" cy="653144"/>
+            </a:xfrm>
+            <a:prstGeom prst="straightConnector1">
+              <a:avLst/>
+            </a:prstGeom>
+            <a:ln w="19050">
+              <a:tailEnd type="triangle"/>
+            </a:ln>
+          </p:spPr>
+          <p:style>
+            <a:lnRef idx="1">
+              <a:schemeClr val="accent1"/>
+            </a:lnRef>
+            <a:fillRef idx="0">
+              <a:schemeClr val="accent1"/>
+            </a:fillRef>
+            <a:effectRef idx="0">
+              <a:schemeClr val="accent1"/>
+            </a:effectRef>
+            <a:fontRef idx="minor">
+              <a:schemeClr val="tx1"/>
+            </a:fontRef>
+          </p:style>
+        </p:cxnSp>
+        <p:sp>
+          <p:nvSpPr>
+            <p:cNvPr id="2" name="TextBox 1"/>
+            <p:cNvSpPr txBox="1"/>
+            <p:nvPr/>
+          </p:nvSpPr>
+          <p:spPr>
+            <a:xfrm>
+              <a:off x="1832344" y="2877400"/>
+              <a:ext cx="1180131" cy="369332"/>
+            </a:xfrm>
+            <a:prstGeom prst="rect">
+              <a:avLst/>
+            </a:prstGeom>
+            <a:noFill/>
+          </p:spPr>
+          <p:txBody>
+            <a:bodyPr wrap="none" rtlCol="0">
+              <a:spAutoFit/>
+            </a:bodyPr>
+            <a:lstStyle/>
+            <a:p>
+              <a:r>
+                <a:rPr lang="en-US" dirty="0" err="1">
+                  <a:solidFill>
+                    <a:schemeClr val="accent2">
+                      <a:lumMod val="75000"/>
+                    </a:schemeClr>
+                  </a:solidFill>
+                </a:rPr>
+                <a:t>a</a:t>
+              </a:r>
+              <a:r>
+                <a:rPr lang="en-US" dirty="0" err="1" smtClean="0">
+                  <a:solidFill>
+                    <a:schemeClr val="accent2">
+                      <a:lumMod val="75000"/>
+                    </a:schemeClr>
+                  </a:solidFill>
+                </a:rPr>
+                <a:t>p_mads</a:t>
+              </a:r>
+              <a:r>
+                <a:rPr lang="en-US" dirty="0" smtClean="0">
+                  <a:solidFill>
+                    <a:schemeClr val="accent2">
+                      <a:lumMod val="75000"/>
+                    </a:schemeClr>
+                  </a:solidFill>
+                </a:rPr>
+                <a:t>()</a:t>
+              </a:r>
+              <a:endParaRPr lang="en-US" dirty="0">
                 <a:solidFill>
                   <a:schemeClr val="accent2">
                     <a:lumMod val="75000"/>
                   </a:schemeClr>
                 </a:solidFill>
-              </a:rPr>
-              <a:t>a</a:t>
-            </a:r>
-            <a:r>
-              <a:rPr lang="en-US" dirty="0" err="1" smtClean="0">
+              </a:endParaRPr>
+            </a:p>
+          </p:txBody>
+        </p:sp>
+        <p:sp>
+          <p:nvSpPr>
+            <p:cNvPr id="3" name="TextBox 2"/>
+            <p:cNvSpPr txBox="1"/>
+            <p:nvPr/>
+          </p:nvSpPr>
+          <p:spPr>
+            <a:xfrm>
+              <a:off x="4430378" y="2877400"/>
+              <a:ext cx="1203856" cy="369332"/>
+            </a:xfrm>
+            <a:prstGeom prst="rect">
+              <a:avLst/>
+            </a:prstGeom>
+            <a:noFill/>
+          </p:spPr>
+          <p:txBody>
+            <a:bodyPr wrap="none" rtlCol="0">
+              <a:spAutoFit/>
+            </a:bodyPr>
+            <a:lstStyle/>
+            <a:p>
+              <a:r>
+                <a:rPr lang="en-US" dirty="0" err="1">
+                  <a:solidFill>
+                    <a:schemeClr val="accent2">
+                      <a:lumMod val="75000"/>
+                    </a:schemeClr>
+                  </a:solidFill>
+                </a:rPr>
+                <a:t>a</a:t>
+              </a:r>
+              <a:r>
+                <a:rPr lang="en-US" dirty="0" err="1" smtClean="0">
+                  <a:solidFill>
+                    <a:schemeClr val="accent2">
+                      <a:lumMod val="75000"/>
+                    </a:schemeClr>
+                  </a:solidFill>
+                </a:rPr>
+                <a:t>p_scoring</a:t>
+              </a:r>
+              <a:endParaRPr lang="en-US" dirty="0">
                 <a:solidFill>
                   <a:schemeClr val="accent2">
                     <a:lumMod val="75000"/>
                   </a:schemeClr>
                 </a:solidFill>
-              </a:rPr>
-              <a:t>p_mads</a:t>
-            </a:r>
-            <a:r>
-              <a:rPr lang="en-US" dirty="0" smtClean="0">
+              </a:endParaRPr>
+            </a:p>
+          </p:txBody>
+        </p:sp>
+        <p:sp>
+          <p:nvSpPr>
+            <p:cNvPr id="9" name="TextBox 8"/>
+            <p:cNvSpPr txBox="1"/>
+            <p:nvPr/>
+          </p:nvSpPr>
+          <p:spPr>
+            <a:xfrm rot="20516041">
+              <a:off x="6755959" y="2616200"/>
+              <a:ext cx="1266244" cy="369332"/>
+            </a:xfrm>
+            <a:prstGeom prst="rect">
+              <a:avLst/>
+            </a:prstGeom>
+            <a:noFill/>
+          </p:spPr>
+          <p:txBody>
+            <a:bodyPr wrap="none" rtlCol="0">
+              <a:spAutoFit/>
+            </a:bodyPr>
+            <a:lstStyle/>
+            <a:p>
+              <a:r>
+                <a:rPr lang="en-US" dirty="0" err="1" smtClean="0">
+                  <a:solidFill>
+                    <a:schemeClr val="accent2">
+                      <a:lumMod val="75000"/>
+                    </a:schemeClr>
+                  </a:solidFill>
+                </a:rPr>
+                <a:t>ap_binary</a:t>
+              </a:r>
+              <a:r>
+                <a:rPr lang="en-US" dirty="0" smtClean="0">
+                  <a:solidFill>
+                    <a:schemeClr val="accent2">
+                      <a:lumMod val="75000"/>
+                    </a:schemeClr>
+                  </a:solidFill>
+                </a:rPr>
+                <a:t>()</a:t>
+              </a:r>
+              <a:endParaRPr lang="en-US" dirty="0">
                 <a:solidFill>
                   <a:schemeClr val="accent2">
                     <a:lumMod val="75000"/>
                   </a:schemeClr>
                 </a:solidFill>
-              </a:rPr>
-              <a:t>()</a:t>
-            </a:r>
-            <a:endParaRPr lang="en-US" dirty="0">
-              <a:solidFill>
-                <a:schemeClr val="accent2">
-                  <a:lumMod val="75000"/>
-                </a:schemeClr>
-              </a:solidFill>
-            </a:endParaRPr>
-          </a:p>
-        </p:txBody>
-      </p:sp>
-      <p:sp>
-        <p:nvSpPr>
-          <p:cNvPr id="3" name="TextBox 2"/>
-          <p:cNvSpPr txBox="1"/>
-          <p:nvPr/>
-        </p:nvSpPr>
-        <p:spPr>
-          <a:xfrm>
-            <a:off x="4430378" y="2877400"/>
-            <a:ext cx="1203856" cy="369332"/>
-          </a:xfrm>
-          <a:prstGeom prst="rect">
-            <a:avLst/>
-          </a:prstGeom>
-          <a:noFill/>
-        </p:spPr>
-        <p:txBody>
-          <a:bodyPr wrap="none" rtlCol="0">
-            <a:spAutoFit/>
-          </a:bodyPr>
-          <a:lstStyle/>
-          <a:p>
-            <a:r>
-              <a:rPr lang="en-US" dirty="0" err="1">
+              </a:endParaRPr>
+            </a:p>
+          </p:txBody>
+        </p:sp>
+        <p:sp>
+          <p:nvSpPr>
+            <p:cNvPr id="11" name="TextBox 10"/>
+            <p:cNvSpPr txBox="1"/>
+            <p:nvPr/>
+          </p:nvSpPr>
+          <p:spPr>
+            <a:xfrm rot="1175553">
+              <a:off x="6396515" y="3605344"/>
+              <a:ext cx="2188741" cy="369332"/>
+            </a:xfrm>
+            <a:prstGeom prst="rect">
+              <a:avLst/>
+            </a:prstGeom>
+            <a:noFill/>
+          </p:spPr>
+          <p:txBody>
+            <a:bodyPr wrap="none" rtlCol="0">
+              <a:spAutoFit/>
+            </a:bodyPr>
+            <a:lstStyle/>
+            <a:p>
+              <a:r>
+                <a:rPr lang="en-US" dirty="0" err="1" smtClean="0">
+                  <a:solidFill>
+                    <a:schemeClr val="accent2">
+                      <a:lumMod val="75000"/>
+                    </a:schemeClr>
+                  </a:solidFill>
+                </a:rPr>
+                <a:t>ap_cutoff_selection</a:t>
+              </a:r>
+              <a:r>
+                <a:rPr lang="en-US" dirty="0" smtClean="0">
+                  <a:solidFill>
+                    <a:schemeClr val="accent2">
+                      <a:lumMod val="75000"/>
+                    </a:schemeClr>
+                  </a:solidFill>
+                </a:rPr>
+                <a:t>()</a:t>
+              </a:r>
+              <a:endParaRPr lang="en-US" dirty="0">
                 <a:solidFill>
                   <a:schemeClr val="accent2">
                     <a:lumMod val="75000"/>
                   </a:schemeClr>
                 </a:solidFill>
-              </a:rPr>
-              <a:t>a</a:t>
-            </a:r>
-            <a:r>
-              <a:rPr lang="en-US" dirty="0" err="1" smtClean="0">
-                <a:solidFill>
-                  <a:schemeClr val="accent2">
-                    <a:lumMod val="75000"/>
-                  </a:schemeClr>
-                </a:solidFill>
-              </a:rPr>
-              <a:t>p_scoring</a:t>
-            </a:r>
-            <a:endParaRPr lang="en-US" dirty="0">
-              <a:solidFill>
-                <a:schemeClr val="accent2">
-                  <a:lumMod val="75000"/>
-                </a:schemeClr>
-              </a:solidFill>
-            </a:endParaRPr>
-          </a:p>
-        </p:txBody>
-      </p:sp>
-      <p:sp>
-        <p:nvSpPr>
-          <p:cNvPr id="9" name="TextBox 8"/>
-          <p:cNvSpPr txBox="1"/>
-          <p:nvPr/>
-        </p:nvSpPr>
-        <p:spPr>
-          <a:xfrm rot="20516041">
-            <a:off x="6755959" y="2616200"/>
-            <a:ext cx="1266244" cy="369332"/>
-          </a:xfrm>
-          <a:prstGeom prst="rect">
-            <a:avLst/>
-          </a:prstGeom>
-          <a:noFill/>
-        </p:spPr>
-        <p:txBody>
-          <a:bodyPr wrap="none" rtlCol="0">
-            <a:spAutoFit/>
-          </a:bodyPr>
-          <a:lstStyle/>
-          <a:p>
-            <a:r>
-              <a:rPr lang="en-US" dirty="0" err="1" smtClean="0">
-                <a:solidFill>
-                  <a:schemeClr val="accent2">
-                    <a:lumMod val="75000"/>
-                  </a:schemeClr>
-                </a:solidFill>
-              </a:rPr>
-              <a:t>ap_binary</a:t>
-            </a:r>
-            <a:r>
-              <a:rPr lang="en-US" dirty="0" smtClean="0">
-                <a:solidFill>
-                  <a:schemeClr val="accent2">
-                    <a:lumMod val="75000"/>
-                  </a:schemeClr>
-                </a:solidFill>
-              </a:rPr>
-              <a:t>()</a:t>
-            </a:r>
-            <a:endParaRPr lang="en-US" dirty="0">
-              <a:solidFill>
-                <a:schemeClr val="accent2">
-                  <a:lumMod val="75000"/>
-                </a:schemeClr>
-              </a:solidFill>
-            </a:endParaRPr>
-          </a:p>
-        </p:txBody>
-      </p:sp>
-      <p:sp>
-        <p:nvSpPr>
-          <p:cNvPr id="11" name="TextBox 10"/>
-          <p:cNvSpPr txBox="1"/>
-          <p:nvPr/>
-        </p:nvSpPr>
-        <p:spPr>
-          <a:xfrm rot="1175553">
-            <a:off x="6396515" y="3605344"/>
-            <a:ext cx="2188741" cy="369332"/>
-          </a:xfrm>
-          <a:prstGeom prst="rect">
-            <a:avLst/>
-          </a:prstGeom>
-          <a:noFill/>
-        </p:spPr>
-        <p:txBody>
-          <a:bodyPr wrap="none" rtlCol="0">
-            <a:spAutoFit/>
-          </a:bodyPr>
-          <a:lstStyle/>
-          <a:p>
-            <a:r>
-              <a:rPr lang="en-US" dirty="0" err="1" smtClean="0">
-                <a:solidFill>
-                  <a:schemeClr val="accent2">
-                    <a:lumMod val="75000"/>
-                  </a:schemeClr>
-                </a:solidFill>
-              </a:rPr>
-              <a:t>ap_cutoff_selection</a:t>
-            </a:r>
-            <a:r>
-              <a:rPr lang="en-US" dirty="0" smtClean="0">
-                <a:solidFill>
-                  <a:schemeClr val="accent2">
-                    <a:lumMod val="75000"/>
-                  </a:schemeClr>
-                </a:solidFill>
-              </a:rPr>
-              <a:t>()</a:t>
-            </a:r>
-            <a:endParaRPr lang="en-US" dirty="0">
-              <a:solidFill>
-                <a:schemeClr val="accent2">
-                  <a:lumMod val="75000"/>
-                </a:schemeClr>
-              </a:solidFill>
-            </a:endParaRPr>
-          </a:p>
-        </p:txBody>
-      </p:sp>
+              </a:endParaRPr>
+            </a:p>
+          </p:txBody>
+        </p:sp>
+      </p:grpSp>
     </p:spTree>
     <p:extLst>
       <p:ext uri="{BB962C8B-B14F-4D97-AF65-F5344CB8AC3E}">
@@ -3832,618 +3862,633 @@
           <a:chExt cx="0" cy="0"/>
         </a:xfrm>
       </p:grpSpPr>
-      <p:sp>
-        <p:nvSpPr>
-          <p:cNvPr id="4" name="TextBox 3"/>
-          <p:cNvSpPr txBox="1"/>
+      <p:grpSp>
+        <p:nvGrpSpPr>
+          <p:cNvPr id="16" name="Group 15"/>
+          <p:cNvGrpSpPr/>
           <p:nvPr/>
-        </p:nvSpPr>
-        <p:spPr>
+        </p:nvGrpSpPr>
+        <p:grpSpPr>
           <a:xfrm>
-            <a:off x="1227909" y="3091542"/>
-            <a:ext cx="553357" cy="369332"/>
+            <a:off x="1227909" y="1517078"/>
+            <a:ext cx="9056914" cy="2976545"/>
+            <a:chOff x="1227909" y="1517078"/>
+            <a:chExt cx="9056914" cy="2976545"/>
           </a:xfrm>
-          <a:prstGeom prst="rect">
-            <a:avLst/>
-          </a:prstGeom>
-          <a:noFill/>
-        </p:spPr>
-        <p:txBody>
-          <a:bodyPr wrap="none" rtlCol="0">
-            <a:spAutoFit/>
-          </a:bodyPr>
-          <a:lstStyle/>
-          <a:p>
-            <a:r>
-              <a:rPr lang="en-US" b="1" dirty="0" smtClean="0"/>
-              <a:t>MFI</a:t>
-            </a:r>
-            <a:endParaRPr lang="en-US" b="1" dirty="0"/>
-          </a:p>
-        </p:txBody>
-      </p:sp>
-      <p:sp>
-        <p:nvSpPr>
-          <p:cNvPr id="5" name="TextBox 4"/>
-          <p:cNvSpPr txBox="1"/>
-          <p:nvPr/>
-        </p:nvSpPr>
-        <p:spPr>
-          <a:xfrm>
-            <a:off x="5681465" y="3091542"/>
-            <a:ext cx="882421" cy="369332"/>
-          </a:xfrm>
-          <a:prstGeom prst="rect">
-            <a:avLst/>
-          </a:prstGeom>
-          <a:noFill/>
-        </p:spPr>
-        <p:txBody>
-          <a:bodyPr wrap="none" rtlCol="0">
-            <a:spAutoFit/>
-          </a:bodyPr>
-          <a:lstStyle/>
-          <a:p>
-            <a:r>
-              <a:rPr lang="en-US" b="1" dirty="0" smtClean="0"/>
-              <a:t>Scoring</a:t>
-            </a:r>
-            <a:endParaRPr lang="en-US" b="1" dirty="0"/>
-          </a:p>
-        </p:txBody>
-      </p:sp>
-      <p:sp>
-        <p:nvSpPr>
-          <p:cNvPr id="6" name="TextBox 5"/>
-          <p:cNvSpPr txBox="1"/>
-          <p:nvPr/>
-        </p:nvSpPr>
-        <p:spPr>
-          <a:xfrm>
-            <a:off x="8321188" y="2508068"/>
-            <a:ext cx="1901546" cy="369332"/>
-          </a:xfrm>
-          <a:prstGeom prst="rect">
-            <a:avLst/>
-          </a:prstGeom>
-          <a:noFill/>
-        </p:spPr>
-        <p:txBody>
-          <a:bodyPr wrap="none" rtlCol="0">
-            <a:spAutoFit/>
-          </a:bodyPr>
-          <a:lstStyle/>
-          <a:p>
-            <a:r>
-              <a:rPr lang="en-US" b="1" dirty="0" smtClean="0"/>
-              <a:t>Binary reactivities</a:t>
-            </a:r>
-            <a:endParaRPr lang="en-US" b="1" dirty="0"/>
-          </a:p>
-        </p:txBody>
-      </p:sp>
-      <p:sp>
-        <p:nvSpPr>
-          <p:cNvPr id="7" name="TextBox 6"/>
-          <p:cNvSpPr txBox="1"/>
-          <p:nvPr/>
-        </p:nvSpPr>
-        <p:spPr>
-          <a:xfrm>
-            <a:off x="3071569" y="3091542"/>
-            <a:ext cx="1335622" cy="369332"/>
-          </a:xfrm>
-          <a:prstGeom prst="rect">
-            <a:avLst/>
-          </a:prstGeom>
-          <a:noFill/>
-        </p:spPr>
-        <p:txBody>
-          <a:bodyPr wrap="none" rtlCol="0">
-            <a:spAutoFit/>
-          </a:bodyPr>
-          <a:lstStyle/>
-          <a:p>
-            <a:r>
-              <a:rPr lang="en-US" b="1" dirty="0" smtClean="0"/>
-              <a:t>Normalizing</a:t>
-            </a:r>
-            <a:endParaRPr lang="en-US" b="1" dirty="0"/>
-          </a:p>
-        </p:txBody>
-      </p:sp>
-      <p:sp>
-        <p:nvSpPr>
-          <p:cNvPr id="8" name="TextBox 7"/>
-          <p:cNvSpPr txBox="1"/>
-          <p:nvPr/>
-        </p:nvSpPr>
-        <p:spPr>
-          <a:xfrm>
-            <a:off x="8417881" y="3744686"/>
-            <a:ext cx="1689245" cy="369332"/>
-          </a:xfrm>
-          <a:prstGeom prst="rect">
-            <a:avLst/>
-          </a:prstGeom>
-          <a:noFill/>
-        </p:spPr>
-        <p:txBody>
-          <a:bodyPr wrap="none" rtlCol="0">
-            <a:spAutoFit/>
-          </a:bodyPr>
-          <a:lstStyle/>
-          <a:p>
-            <a:r>
-              <a:rPr lang="en-US" b="1" dirty="0" smtClean="0"/>
-              <a:t>Cutoff selection</a:t>
-            </a:r>
-            <a:endParaRPr lang="en-US" b="1" dirty="0"/>
-          </a:p>
-        </p:txBody>
-      </p:sp>
-      <p:cxnSp>
-        <p:nvCxnSpPr>
-          <p:cNvPr id="10" name="Straight Arrow Connector 9"/>
-          <p:cNvCxnSpPr>
-            <a:stCxn id="4" idx="3"/>
-            <a:endCxn id="7" idx="1"/>
-          </p:cNvCxnSpPr>
-          <p:nvPr/>
-        </p:nvCxnSpPr>
-        <p:spPr>
-          <a:xfrm>
-            <a:off x="1773251" y="3276208"/>
-            <a:ext cx="1298318" cy="0"/>
-          </a:xfrm>
-          <a:prstGeom prst="straightConnector1">
-            <a:avLst/>
-          </a:prstGeom>
-          <a:ln w="19050">
-            <a:tailEnd type="triangle"/>
-          </a:ln>
-        </p:spPr>
-        <p:style>
-          <a:lnRef idx="1">
-            <a:schemeClr val="accent1"/>
-          </a:lnRef>
-          <a:fillRef idx="0">
-            <a:schemeClr val="accent1"/>
-          </a:fillRef>
-          <a:effectRef idx="0">
-            <a:schemeClr val="accent1"/>
-          </a:effectRef>
-          <a:fontRef idx="minor">
-            <a:schemeClr val="tx1"/>
-          </a:fontRef>
-        </p:style>
-      </p:cxnSp>
-      <p:cxnSp>
-        <p:nvCxnSpPr>
-          <p:cNvPr id="13" name="Straight Arrow Connector 12"/>
-          <p:cNvCxnSpPr>
-            <a:stCxn id="7" idx="3"/>
-            <a:endCxn id="5" idx="1"/>
-          </p:cNvCxnSpPr>
-          <p:nvPr/>
-        </p:nvCxnSpPr>
-        <p:spPr>
-          <a:xfrm>
-            <a:off x="4383147" y="3276208"/>
-            <a:ext cx="1298318" cy="0"/>
-          </a:xfrm>
-          <a:prstGeom prst="straightConnector1">
-            <a:avLst/>
-          </a:prstGeom>
-          <a:ln w="19050">
-            <a:tailEnd type="triangle"/>
-          </a:ln>
-        </p:spPr>
-        <p:style>
-          <a:lnRef idx="1">
-            <a:schemeClr val="accent1"/>
-          </a:lnRef>
-          <a:fillRef idx="0">
-            <a:schemeClr val="accent1"/>
-          </a:fillRef>
-          <a:effectRef idx="0">
-            <a:schemeClr val="accent1"/>
-          </a:effectRef>
-          <a:fontRef idx="minor">
-            <a:schemeClr val="tx1"/>
-          </a:fontRef>
-        </p:style>
-      </p:cxnSp>
-      <p:cxnSp>
-        <p:nvCxnSpPr>
-          <p:cNvPr id="15" name="Straight Arrow Connector 14"/>
-          <p:cNvCxnSpPr>
-            <a:stCxn id="5" idx="3"/>
-            <a:endCxn id="6" idx="1"/>
-          </p:cNvCxnSpPr>
-          <p:nvPr/>
-        </p:nvCxnSpPr>
-        <p:spPr>
-          <a:xfrm flipV="1">
-            <a:off x="6563886" y="2692734"/>
-            <a:ext cx="1757302" cy="583474"/>
-          </a:xfrm>
-          <a:prstGeom prst="straightConnector1">
-            <a:avLst/>
-          </a:prstGeom>
-          <a:ln w="19050">
-            <a:tailEnd type="triangle"/>
-          </a:ln>
-        </p:spPr>
-        <p:style>
-          <a:lnRef idx="1">
-            <a:schemeClr val="accent1"/>
-          </a:lnRef>
-          <a:fillRef idx="0">
-            <a:schemeClr val="accent1"/>
-          </a:fillRef>
-          <a:effectRef idx="0">
-            <a:schemeClr val="accent1"/>
-          </a:effectRef>
-          <a:fontRef idx="minor">
-            <a:schemeClr val="tx1"/>
-          </a:fontRef>
-        </p:style>
-      </p:cxnSp>
-      <p:cxnSp>
-        <p:nvCxnSpPr>
-          <p:cNvPr id="17" name="Straight Arrow Connector 16"/>
-          <p:cNvCxnSpPr>
-            <a:stCxn id="5" idx="3"/>
-            <a:endCxn id="8" idx="1"/>
-          </p:cNvCxnSpPr>
-          <p:nvPr/>
-        </p:nvCxnSpPr>
-        <p:spPr>
-          <a:xfrm>
-            <a:off x="6563886" y="3276208"/>
-            <a:ext cx="1853995" cy="653144"/>
-          </a:xfrm>
-          <a:prstGeom prst="straightConnector1">
-            <a:avLst/>
-          </a:prstGeom>
-          <a:ln w="19050">
-            <a:tailEnd type="triangle"/>
-          </a:ln>
-        </p:spPr>
-        <p:style>
-          <a:lnRef idx="1">
-            <a:schemeClr val="accent1"/>
-          </a:lnRef>
-          <a:fillRef idx="0">
-            <a:schemeClr val="accent1"/>
-          </a:fillRef>
-          <a:effectRef idx="0">
-            <a:schemeClr val="accent1"/>
-          </a:effectRef>
-          <a:fontRef idx="minor">
-            <a:schemeClr val="tx1"/>
-          </a:fontRef>
-        </p:style>
-      </p:cxnSp>
-      <p:sp>
-        <p:nvSpPr>
-          <p:cNvPr id="2" name="TextBox 1"/>
-          <p:cNvSpPr txBox="1"/>
-          <p:nvPr/>
-        </p:nvSpPr>
-        <p:spPr>
-          <a:xfrm>
-            <a:off x="1832344" y="2877400"/>
-            <a:ext cx="1180131" cy="369332"/>
-          </a:xfrm>
-          <a:prstGeom prst="rect">
-            <a:avLst/>
-          </a:prstGeom>
-          <a:noFill/>
-        </p:spPr>
-        <p:txBody>
-          <a:bodyPr wrap="none" rtlCol="0">
-            <a:spAutoFit/>
-          </a:bodyPr>
-          <a:lstStyle/>
-          <a:p>
-            <a:r>
-              <a:rPr lang="en-US" dirty="0" err="1">
+        </p:grpSpPr>
+        <p:sp>
+          <p:nvSpPr>
+            <p:cNvPr id="4" name="TextBox 3"/>
+            <p:cNvSpPr txBox="1"/>
+            <p:nvPr/>
+          </p:nvSpPr>
+          <p:spPr>
+            <a:xfrm>
+              <a:off x="1227909" y="3091542"/>
+              <a:ext cx="553357" cy="369332"/>
+            </a:xfrm>
+            <a:prstGeom prst="rect">
+              <a:avLst/>
+            </a:prstGeom>
+            <a:noFill/>
+          </p:spPr>
+          <p:txBody>
+            <a:bodyPr wrap="none" rtlCol="0">
+              <a:spAutoFit/>
+            </a:bodyPr>
+            <a:lstStyle/>
+            <a:p>
+              <a:r>
+                <a:rPr lang="en-US" b="1" dirty="0" smtClean="0"/>
+                <a:t>MFI</a:t>
+              </a:r>
+              <a:endParaRPr lang="en-US" b="1" dirty="0"/>
+            </a:p>
+          </p:txBody>
+        </p:sp>
+        <p:sp>
+          <p:nvSpPr>
+            <p:cNvPr id="5" name="TextBox 4"/>
+            <p:cNvSpPr txBox="1"/>
+            <p:nvPr/>
+          </p:nvSpPr>
+          <p:spPr>
+            <a:xfrm>
+              <a:off x="5681465" y="3091542"/>
+              <a:ext cx="882421" cy="369332"/>
+            </a:xfrm>
+            <a:prstGeom prst="rect">
+              <a:avLst/>
+            </a:prstGeom>
+            <a:noFill/>
+          </p:spPr>
+          <p:txBody>
+            <a:bodyPr wrap="none" rtlCol="0">
+              <a:spAutoFit/>
+            </a:bodyPr>
+            <a:lstStyle/>
+            <a:p>
+              <a:r>
+                <a:rPr lang="en-US" b="1" dirty="0" smtClean="0"/>
+                <a:t>Scoring</a:t>
+              </a:r>
+              <a:endParaRPr lang="en-US" b="1" dirty="0"/>
+            </a:p>
+          </p:txBody>
+        </p:sp>
+        <p:sp>
+          <p:nvSpPr>
+            <p:cNvPr id="6" name="TextBox 5"/>
+            <p:cNvSpPr txBox="1"/>
+            <p:nvPr/>
+          </p:nvSpPr>
+          <p:spPr>
+            <a:xfrm>
+              <a:off x="8321188" y="2508068"/>
+              <a:ext cx="1901546" cy="369332"/>
+            </a:xfrm>
+            <a:prstGeom prst="rect">
+              <a:avLst/>
+            </a:prstGeom>
+            <a:noFill/>
+          </p:spPr>
+          <p:txBody>
+            <a:bodyPr wrap="none" rtlCol="0">
+              <a:spAutoFit/>
+            </a:bodyPr>
+            <a:lstStyle/>
+            <a:p>
+              <a:r>
+                <a:rPr lang="en-US" b="1" dirty="0" smtClean="0"/>
+                <a:t>Binary reactivities</a:t>
+              </a:r>
+              <a:endParaRPr lang="en-US" b="1" dirty="0"/>
+            </a:p>
+          </p:txBody>
+        </p:sp>
+        <p:sp>
+          <p:nvSpPr>
+            <p:cNvPr id="7" name="TextBox 6"/>
+            <p:cNvSpPr txBox="1"/>
+            <p:nvPr/>
+          </p:nvSpPr>
+          <p:spPr>
+            <a:xfrm>
+              <a:off x="3071569" y="3091542"/>
+              <a:ext cx="1335622" cy="369332"/>
+            </a:xfrm>
+            <a:prstGeom prst="rect">
+              <a:avLst/>
+            </a:prstGeom>
+            <a:noFill/>
+          </p:spPr>
+          <p:txBody>
+            <a:bodyPr wrap="none" rtlCol="0">
+              <a:spAutoFit/>
+            </a:bodyPr>
+            <a:lstStyle/>
+            <a:p>
+              <a:r>
+                <a:rPr lang="en-US" b="1" dirty="0" smtClean="0"/>
+                <a:t>Normalizing</a:t>
+              </a:r>
+              <a:endParaRPr lang="en-US" b="1" dirty="0"/>
+            </a:p>
+          </p:txBody>
+        </p:sp>
+        <p:sp>
+          <p:nvSpPr>
+            <p:cNvPr id="8" name="TextBox 7"/>
+            <p:cNvSpPr txBox="1"/>
+            <p:nvPr/>
+          </p:nvSpPr>
+          <p:spPr>
+            <a:xfrm>
+              <a:off x="8417881" y="3744686"/>
+              <a:ext cx="1689245" cy="369332"/>
+            </a:xfrm>
+            <a:prstGeom prst="rect">
+              <a:avLst/>
+            </a:prstGeom>
+            <a:noFill/>
+          </p:spPr>
+          <p:txBody>
+            <a:bodyPr wrap="none" rtlCol="0">
+              <a:spAutoFit/>
+            </a:bodyPr>
+            <a:lstStyle/>
+            <a:p>
+              <a:r>
+                <a:rPr lang="en-US" b="1" dirty="0" smtClean="0"/>
+                <a:t>Cutoff selection</a:t>
+              </a:r>
+              <a:endParaRPr lang="en-US" b="1" dirty="0"/>
+            </a:p>
+          </p:txBody>
+        </p:sp>
+        <p:cxnSp>
+          <p:nvCxnSpPr>
+            <p:cNvPr id="10" name="Straight Arrow Connector 9"/>
+            <p:cNvCxnSpPr>
+              <a:stCxn id="4" idx="3"/>
+              <a:endCxn id="7" idx="1"/>
+            </p:cNvCxnSpPr>
+            <p:nvPr/>
+          </p:nvCxnSpPr>
+          <p:spPr>
+            <a:xfrm>
+              <a:off x="1773251" y="3276208"/>
+              <a:ext cx="1298318" cy="0"/>
+            </a:xfrm>
+            <a:prstGeom prst="straightConnector1">
+              <a:avLst/>
+            </a:prstGeom>
+            <a:ln w="19050">
+              <a:tailEnd type="triangle"/>
+            </a:ln>
+          </p:spPr>
+          <p:style>
+            <a:lnRef idx="1">
+              <a:schemeClr val="accent1"/>
+            </a:lnRef>
+            <a:fillRef idx="0">
+              <a:schemeClr val="accent1"/>
+            </a:fillRef>
+            <a:effectRef idx="0">
+              <a:schemeClr val="accent1"/>
+            </a:effectRef>
+            <a:fontRef idx="minor">
+              <a:schemeClr val="tx1"/>
+            </a:fontRef>
+          </p:style>
+        </p:cxnSp>
+        <p:cxnSp>
+          <p:nvCxnSpPr>
+            <p:cNvPr id="13" name="Straight Arrow Connector 12"/>
+            <p:cNvCxnSpPr>
+              <a:stCxn id="7" idx="3"/>
+              <a:endCxn id="5" idx="1"/>
+            </p:cNvCxnSpPr>
+            <p:nvPr/>
+          </p:nvCxnSpPr>
+          <p:spPr>
+            <a:xfrm>
+              <a:off x="4383147" y="3276208"/>
+              <a:ext cx="1298318" cy="0"/>
+            </a:xfrm>
+            <a:prstGeom prst="straightConnector1">
+              <a:avLst/>
+            </a:prstGeom>
+            <a:ln w="19050">
+              <a:tailEnd type="triangle"/>
+            </a:ln>
+          </p:spPr>
+          <p:style>
+            <a:lnRef idx="1">
+              <a:schemeClr val="accent1"/>
+            </a:lnRef>
+            <a:fillRef idx="0">
+              <a:schemeClr val="accent1"/>
+            </a:fillRef>
+            <a:effectRef idx="0">
+              <a:schemeClr val="accent1"/>
+            </a:effectRef>
+            <a:fontRef idx="minor">
+              <a:schemeClr val="tx1"/>
+            </a:fontRef>
+          </p:style>
+        </p:cxnSp>
+        <p:cxnSp>
+          <p:nvCxnSpPr>
+            <p:cNvPr id="15" name="Straight Arrow Connector 14"/>
+            <p:cNvCxnSpPr>
+              <a:stCxn id="5" idx="3"/>
+              <a:endCxn id="6" idx="1"/>
+            </p:cNvCxnSpPr>
+            <p:nvPr/>
+          </p:nvCxnSpPr>
+          <p:spPr>
+            <a:xfrm flipV="1">
+              <a:off x="6563886" y="2692734"/>
+              <a:ext cx="1757302" cy="583474"/>
+            </a:xfrm>
+            <a:prstGeom prst="straightConnector1">
+              <a:avLst/>
+            </a:prstGeom>
+            <a:ln w="19050">
+              <a:tailEnd type="triangle"/>
+            </a:ln>
+          </p:spPr>
+          <p:style>
+            <a:lnRef idx="1">
+              <a:schemeClr val="accent1"/>
+            </a:lnRef>
+            <a:fillRef idx="0">
+              <a:schemeClr val="accent1"/>
+            </a:fillRef>
+            <a:effectRef idx="0">
+              <a:schemeClr val="accent1"/>
+            </a:effectRef>
+            <a:fontRef idx="minor">
+              <a:schemeClr val="tx1"/>
+            </a:fontRef>
+          </p:style>
+        </p:cxnSp>
+        <p:cxnSp>
+          <p:nvCxnSpPr>
+            <p:cNvPr id="17" name="Straight Arrow Connector 16"/>
+            <p:cNvCxnSpPr>
+              <a:stCxn id="5" idx="3"/>
+              <a:endCxn id="8" idx="1"/>
+            </p:cNvCxnSpPr>
+            <p:nvPr/>
+          </p:nvCxnSpPr>
+          <p:spPr>
+            <a:xfrm>
+              <a:off x="6563886" y="3276208"/>
+              <a:ext cx="1853995" cy="653144"/>
+            </a:xfrm>
+            <a:prstGeom prst="straightConnector1">
+              <a:avLst/>
+            </a:prstGeom>
+            <a:ln w="19050">
+              <a:tailEnd type="triangle"/>
+            </a:ln>
+          </p:spPr>
+          <p:style>
+            <a:lnRef idx="1">
+              <a:schemeClr val="accent1"/>
+            </a:lnRef>
+            <a:fillRef idx="0">
+              <a:schemeClr val="accent1"/>
+            </a:fillRef>
+            <a:effectRef idx="0">
+              <a:schemeClr val="accent1"/>
+            </a:effectRef>
+            <a:fontRef idx="minor">
+              <a:schemeClr val="tx1"/>
+            </a:fontRef>
+          </p:style>
+        </p:cxnSp>
+        <p:sp>
+          <p:nvSpPr>
+            <p:cNvPr id="2" name="TextBox 1"/>
+            <p:cNvSpPr txBox="1"/>
+            <p:nvPr/>
+          </p:nvSpPr>
+          <p:spPr>
+            <a:xfrm>
+              <a:off x="1832344" y="2877400"/>
+              <a:ext cx="1180131" cy="369332"/>
+            </a:xfrm>
+            <a:prstGeom prst="rect">
+              <a:avLst/>
+            </a:prstGeom>
+            <a:noFill/>
+          </p:spPr>
+          <p:txBody>
+            <a:bodyPr wrap="none" rtlCol="0">
+              <a:spAutoFit/>
+            </a:bodyPr>
+            <a:lstStyle/>
+            <a:p>
+              <a:r>
+                <a:rPr lang="en-US" dirty="0" err="1">
+                  <a:solidFill>
+                    <a:schemeClr val="accent2">
+                      <a:lumMod val="75000"/>
+                    </a:schemeClr>
+                  </a:solidFill>
+                </a:rPr>
+                <a:t>a</a:t>
+              </a:r>
+              <a:r>
+                <a:rPr lang="en-US" dirty="0" err="1" smtClean="0">
+                  <a:solidFill>
+                    <a:schemeClr val="accent2">
+                      <a:lumMod val="75000"/>
+                    </a:schemeClr>
+                  </a:solidFill>
+                </a:rPr>
+                <a:t>p_mads</a:t>
+              </a:r>
+              <a:r>
+                <a:rPr lang="en-US" dirty="0" smtClean="0">
+                  <a:solidFill>
+                    <a:schemeClr val="accent2">
+                      <a:lumMod val="75000"/>
+                    </a:schemeClr>
+                  </a:solidFill>
+                </a:rPr>
+                <a:t>()</a:t>
+              </a:r>
+              <a:endParaRPr lang="en-US" dirty="0">
                 <a:solidFill>
                   <a:schemeClr val="accent2">
                     <a:lumMod val="75000"/>
                   </a:schemeClr>
                 </a:solidFill>
-              </a:rPr>
-              <a:t>a</a:t>
-            </a:r>
-            <a:r>
-              <a:rPr lang="en-US" dirty="0" err="1" smtClean="0">
+              </a:endParaRPr>
+            </a:p>
+          </p:txBody>
+        </p:sp>
+        <p:sp>
+          <p:nvSpPr>
+            <p:cNvPr id="3" name="TextBox 2"/>
+            <p:cNvSpPr txBox="1"/>
+            <p:nvPr/>
+          </p:nvSpPr>
+          <p:spPr>
+            <a:xfrm>
+              <a:off x="4430378" y="2877400"/>
+              <a:ext cx="1203856" cy="369332"/>
+            </a:xfrm>
+            <a:prstGeom prst="rect">
+              <a:avLst/>
+            </a:prstGeom>
+            <a:noFill/>
+          </p:spPr>
+          <p:txBody>
+            <a:bodyPr wrap="none" rtlCol="0">
+              <a:spAutoFit/>
+            </a:bodyPr>
+            <a:lstStyle/>
+            <a:p>
+              <a:r>
+                <a:rPr lang="en-US" dirty="0" err="1">
+                  <a:solidFill>
+                    <a:schemeClr val="accent2">
+                      <a:lumMod val="75000"/>
+                    </a:schemeClr>
+                  </a:solidFill>
+                </a:rPr>
+                <a:t>a</a:t>
+              </a:r>
+              <a:r>
+                <a:rPr lang="en-US" dirty="0" err="1" smtClean="0">
+                  <a:solidFill>
+                    <a:schemeClr val="accent2">
+                      <a:lumMod val="75000"/>
+                    </a:schemeClr>
+                  </a:solidFill>
+                </a:rPr>
+                <a:t>p_scoring</a:t>
+              </a:r>
+              <a:endParaRPr lang="en-US" dirty="0">
                 <a:solidFill>
                   <a:schemeClr val="accent2">
                     <a:lumMod val="75000"/>
                   </a:schemeClr>
                 </a:solidFill>
-              </a:rPr>
-              <a:t>p_mads</a:t>
-            </a:r>
-            <a:r>
-              <a:rPr lang="en-US" dirty="0" smtClean="0">
+              </a:endParaRPr>
+            </a:p>
+          </p:txBody>
+        </p:sp>
+        <p:sp>
+          <p:nvSpPr>
+            <p:cNvPr id="9" name="TextBox 8"/>
+            <p:cNvSpPr txBox="1"/>
+            <p:nvPr/>
+          </p:nvSpPr>
+          <p:spPr>
+            <a:xfrm rot="20516041">
+              <a:off x="6755959" y="2616200"/>
+              <a:ext cx="1266244" cy="369332"/>
+            </a:xfrm>
+            <a:prstGeom prst="rect">
+              <a:avLst/>
+            </a:prstGeom>
+            <a:noFill/>
+          </p:spPr>
+          <p:txBody>
+            <a:bodyPr wrap="none" rtlCol="0">
+              <a:spAutoFit/>
+            </a:bodyPr>
+            <a:lstStyle/>
+            <a:p>
+              <a:r>
+                <a:rPr lang="en-US" dirty="0" err="1" smtClean="0">
+                  <a:solidFill>
+                    <a:schemeClr val="accent2">
+                      <a:lumMod val="75000"/>
+                    </a:schemeClr>
+                  </a:solidFill>
+                </a:rPr>
+                <a:t>ap_binary</a:t>
+              </a:r>
+              <a:r>
+                <a:rPr lang="en-US" dirty="0" smtClean="0">
+                  <a:solidFill>
+                    <a:schemeClr val="accent2">
+                      <a:lumMod val="75000"/>
+                    </a:schemeClr>
+                  </a:solidFill>
+                </a:rPr>
+                <a:t>()</a:t>
+              </a:r>
+              <a:endParaRPr lang="en-US" dirty="0">
                 <a:solidFill>
                   <a:schemeClr val="accent2">
                     <a:lumMod val="75000"/>
                   </a:schemeClr>
                 </a:solidFill>
-              </a:rPr>
-              <a:t>()</a:t>
-            </a:r>
-            <a:endParaRPr lang="en-US" dirty="0">
-              <a:solidFill>
-                <a:schemeClr val="accent2">
-                  <a:lumMod val="75000"/>
-                </a:schemeClr>
-              </a:solidFill>
-            </a:endParaRPr>
-          </a:p>
-        </p:txBody>
-      </p:sp>
-      <p:sp>
-        <p:nvSpPr>
-          <p:cNvPr id="3" name="TextBox 2"/>
-          <p:cNvSpPr txBox="1"/>
-          <p:nvPr/>
-        </p:nvSpPr>
-        <p:spPr>
-          <a:xfrm>
-            <a:off x="4430378" y="2877400"/>
-            <a:ext cx="1203856" cy="369332"/>
-          </a:xfrm>
-          <a:prstGeom prst="rect">
-            <a:avLst/>
-          </a:prstGeom>
-          <a:noFill/>
-        </p:spPr>
-        <p:txBody>
-          <a:bodyPr wrap="none" rtlCol="0">
-            <a:spAutoFit/>
-          </a:bodyPr>
-          <a:lstStyle/>
-          <a:p>
-            <a:r>
-              <a:rPr lang="en-US" dirty="0" err="1">
+              </a:endParaRPr>
+            </a:p>
+          </p:txBody>
+        </p:sp>
+        <p:sp>
+          <p:nvSpPr>
+            <p:cNvPr id="11" name="TextBox 10"/>
+            <p:cNvSpPr txBox="1"/>
+            <p:nvPr/>
+          </p:nvSpPr>
+          <p:spPr>
+            <a:xfrm rot="1175553">
+              <a:off x="6396515" y="3605344"/>
+              <a:ext cx="2188741" cy="369332"/>
+            </a:xfrm>
+            <a:prstGeom prst="rect">
+              <a:avLst/>
+            </a:prstGeom>
+            <a:noFill/>
+          </p:spPr>
+          <p:txBody>
+            <a:bodyPr wrap="none" rtlCol="0">
+              <a:spAutoFit/>
+            </a:bodyPr>
+            <a:lstStyle/>
+            <a:p>
+              <a:r>
+                <a:rPr lang="en-US" dirty="0" err="1" smtClean="0">
+                  <a:solidFill>
+                    <a:schemeClr val="accent2">
+                      <a:lumMod val="75000"/>
+                    </a:schemeClr>
+                  </a:solidFill>
+                </a:rPr>
+                <a:t>ap_cutoff_selection</a:t>
+              </a:r>
+              <a:r>
+                <a:rPr lang="en-US" dirty="0" smtClean="0">
+                  <a:solidFill>
+                    <a:schemeClr val="accent2">
+                      <a:lumMod val="75000"/>
+                    </a:schemeClr>
+                  </a:solidFill>
+                </a:rPr>
+                <a:t>()</a:t>
+              </a:r>
+              <a:endParaRPr lang="en-US" dirty="0">
                 <a:solidFill>
                   <a:schemeClr val="accent2">
                     <a:lumMod val="75000"/>
                   </a:schemeClr>
                 </a:solidFill>
-              </a:rPr>
-              <a:t>a</a:t>
-            </a:r>
-            <a:r>
-              <a:rPr lang="en-US" dirty="0" err="1" smtClean="0">
-                <a:solidFill>
-                  <a:schemeClr val="accent2">
-                    <a:lumMod val="75000"/>
-                  </a:schemeClr>
-                </a:solidFill>
-              </a:rPr>
-              <a:t>p_scoring</a:t>
-            </a:r>
-            <a:endParaRPr lang="en-US" dirty="0">
+              </a:endParaRPr>
+            </a:p>
+          </p:txBody>
+        </p:sp>
+        <p:sp>
+          <p:nvSpPr>
+            <p:cNvPr id="12" name="Rectangle 11"/>
+            <p:cNvSpPr/>
+            <p:nvPr/>
+          </p:nvSpPr>
+          <p:spPr>
+            <a:xfrm>
+              <a:off x="1227909" y="1915886"/>
+              <a:ext cx="9056914" cy="2577737"/>
+            </a:xfrm>
+            <a:prstGeom prst="rect">
+              <a:avLst/>
+            </a:prstGeom>
+            <a:noFill/>
+            <a:ln w="28575">
               <a:solidFill>
-                <a:schemeClr val="accent2">
-                  <a:lumMod val="75000"/>
-                </a:schemeClr>
+                <a:srgbClr val="7030A0"/>
               </a:solidFill>
-            </a:endParaRPr>
-          </a:p>
-        </p:txBody>
-      </p:sp>
-      <p:sp>
-        <p:nvSpPr>
-          <p:cNvPr id="9" name="TextBox 8"/>
-          <p:cNvSpPr txBox="1"/>
-          <p:nvPr/>
-        </p:nvSpPr>
-        <p:spPr>
-          <a:xfrm rot="20516041">
-            <a:off x="6755959" y="2616200"/>
-            <a:ext cx="1266244" cy="369332"/>
-          </a:xfrm>
-          <a:prstGeom prst="rect">
-            <a:avLst/>
-          </a:prstGeom>
-          <a:noFill/>
-        </p:spPr>
-        <p:txBody>
-          <a:bodyPr wrap="none" rtlCol="0">
-            <a:spAutoFit/>
-          </a:bodyPr>
-          <a:lstStyle/>
-          <a:p>
-            <a:r>
-              <a:rPr lang="en-US" dirty="0" err="1" smtClean="0">
-                <a:solidFill>
-                  <a:schemeClr val="accent2">
-                    <a:lumMod val="75000"/>
-                  </a:schemeClr>
-                </a:solidFill>
-              </a:rPr>
-              <a:t>ap_binary</a:t>
-            </a:r>
-            <a:r>
-              <a:rPr lang="en-US" dirty="0" smtClean="0">
-                <a:solidFill>
-                  <a:schemeClr val="accent2">
-                    <a:lumMod val="75000"/>
-                  </a:schemeClr>
-                </a:solidFill>
-              </a:rPr>
-              <a:t>()</a:t>
-            </a:r>
-            <a:endParaRPr lang="en-US" dirty="0">
-              <a:solidFill>
-                <a:schemeClr val="accent2">
-                  <a:lumMod val="75000"/>
-                </a:schemeClr>
-              </a:solidFill>
-            </a:endParaRPr>
-          </a:p>
-        </p:txBody>
-      </p:sp>
-      <p:sp>
-        <p:nvSpPr>
-          <p:cNvPr id="11" name="TextBox 10"/>
-          <p:cNvSpPr txBox="1"/>
-          <p:nvPr/>
-        </p:nvSpPr>
-        <p:spPr>
-          <a:xfrm rot="1175553">
-            <a:off x="6396515" y="3605344"/>
-            <a:ext cx="2188741" cy="369332"/>
-          </a:xfrm>
-          <a:prstGeom prst="rect">
-            <a:avLst/>
-          </a:prstGeom>
-          <a:noFill/>
-        </p:spPr>
-        <p:txBody>
-          <a:bodyPr wrap="none" rtlCol="0">
-            <a:spAutoFit/>
-          </a:bodyPr>
-          <a:lstStyle/>
-          <a:p>
-            <a:r>
-              <a:rPr lang="en-US" dirty="0" err="1" smtClean="0">
-                <a:solidFill>
-                  <a:schemeClr val="accent2">
-                    <a:lumMod val="75000"/>
-                  </a:schemeClr>
-                </a:solidFill>
-              </a:rPr>
-              <a:t>ap_cutoff_selection</a:t>
-            </a:r>
-            <a:r>
-              <a:rPr lang="en-US" dirty="0" smtClean="0">
-                <a:solidFill>
-                  <a:schemeClr val="accent2">
-                    <a:lumMod val="75000"/>
-                  </a:schemeClr>
-                </a:solidFill>
-              </a:rPr>
-              <a:t>()</a:t>
-            </a:r>
-            <a:endParaRPr lang="en-US" dirty="0">
-              <a:solidFill>
-                <a:schemeClr val="accent2">
-                  <a:lumMod val="75000"/>
-                </a:schemeClr>
-              </a:solidFill>
-            </a:endParaRPr>
-          </a:p>
-        </p:txBody>
-      </p:sp>
-      <p:sp>
-        <p:nvSpPr>
-          <p:cNvPr id="12" name="Rectangle 11"/>
-          <p:cNvSpPr/>
-          <p:nvPr/>
-        </p:nvSpPr>
-        <p:spPr>
-          <a:xfrm>
-            <a:off x="1227909" y="1915886"/>
-            <a:ext cx="9056914" cy="2577737"/>
-          </a:xfrm>
-          <a:prstGeom prst="rect">
-            <a:avLst/>
-          </a:prstGeom>
-          <a:noFill/>
-          <a:ln w="28575">
-            <a:solidFill>
-              <a:srgbClr val="7030A0"/>
-            </a:solidFill>
-          </a:ln>
-        </p:spPr>
-        <p:style>
-          <a:lnRef idx="2">
-            <a:schemeClr val="accent1">
-              <a:shade val="50000"/>
-            </a:schemeClr>
-          </a:lnRef>
-          <a:fillRef idx="1">
-            <a:schemeClr val="accent1"/>
-          </a:fillRef>
-          <a:effectRef idx="0">
-            <a:schemeClr val="accent1"/>
-          </a:effectRef>
-          <a:fontRef idx="minor">
-            <a:schemeClr val="lt1"/>
-          </a:fontRef>
-        </p:style>
-        <p:txBody>
-          <a:bodyPr rtlCol="0" anchor="ctr"/>
-          <a:lstStyle/>
-          <a:p>
-            <a:pPr algn="ctr"/>
-            <a:endParaRPr lang="en-US"/>
-          </a:p>
-        </p:txBody>
-      </p:sp>
-      <p:sp>
-        <p:nvSpPr>
-          <p:cNvPr id="14" name="TextBox 13"/>
-          <p:cNvSpPr txBox="1"/>
-          <p:nvPr/>
-        </p:nvSpPr>
-        <p:spPr>
-          <a:xfrm>
-            <a:off x="5165499" y="1517078"/>
-            <a:ext cx="1181734" cy="369332"/>
-          </a:xfrm>
-          <a:prstGeom prst="rect">
-            <a:avLst/>
-          </a:prstGeom>
-          <a:noFill/>
-        </p:spPr>
-        <p:txBody>
-          <a:bodyPr wrap="none" rtlCol="0">
-            <a:spAutoFit/>
-          </a:bodyPr>
-          <a:lstStyle/>
-          <a:p>
-            <a:r>
-              <a:rPr lang="en-US" dirty="0" err="1">
+            </a:ln>
+          </p:spPr>
+          <p:style>
+            <a:lnRef idx="2">
+              <a:schemeClr val="accent1">
+                <a:shade val="50000"/>
+              </a:schemeClr>
+            </a:lnRef>
+            <a:fillRef idx="1">
+              <a:schemeClr val="accent1"/>
+            </a:fillRef>
+            <a:effectRef idx="0">
+              <a:schemeClr val="accent1"/>
+            </a:effectRef>
+            <a:fontRef idx="minor">
+              <a:schemeClr val="lt1"/>
+            </a:fontRef>
+          </p:style>
+          <p:txBody>
+            <a:bodyPr rtlCol="0" anchor="ctr"/>
+            <a:lstStyle/>
+            <a:p>
+              <a:pPr algn="ctr"/>
+              <a:endParaRPr lang="en-US"/>
+            </a:p>
+          </p:txBody>
+        </p:sp>
+        <p:sp>
+          <p:nvSpPr>
+            <p:cNvPr id="14" name="TextBox 13"/>
+            <p:cNvSpPr txBox="1"/>
+            <p:nvPr/>
+          </p:nvSpPr>
+          <p:spPr>
+            <a:xfrm>
+              <a:off x="5165499" y="1517078"/>
+              <a:ext cx="1181734" cy="369332"/>
+            </a:xfrm>
+            <a:prstGeom prst="rect">
+              <a:avLst/>
+            </a:prstGeom>
+            <a:noFill/>
+          </p:spPr>
+          <p:txBody>
+            <a:bodyPr wrap="none" rtlCol="0">
+              <a:spAutoFit/>
+            </a:bodyPr>
+            <a:lstStyle/>
+            <a:p>
+              <a:r>
+                <a:rPr lang="en-US" dirty="0" err="1">
+                  <a:solidFill>
+                    <a:srgbClr val="7030A0"/>
+                  </a:solidFill>
+                </a:rPr>
+                <a:t>a</a:t>
+              </a:r>
+              <a:r>
+                <a:rPr lang="en-US" dirty="0" err="1" smtClean="0">
+                  <a:solidFill>
+                    <a:srgbClr val="7030A0"/>
+                  </a:solidFill>
+                </a:rPr>
+                <a:t>p_norm</a:t>
+              </a:r>
+              <a:r>
+                <a:rPr lang="en-US" dirty="0" smtClean="0">
+                  <a:solidFill>
+                    <a:srgbClr val="7030A0"/>
+                  </a:solidFill>
+                </a:rPr>
+                <a:t>()</a:t>
+              </a:r>
+              <a:endParaRPr lang="en-US" dirty="0">
                 <a:solidFill>
                   <a:srgbClr val="7030A0"/>
                 </a:solidFill>
-              </a:rPr>
-              <a:t>a</a:t>
-            </a:r>
-            <a:r>
-              <a:rPr lang="en-US" dirty="0" err="1" smtClean="0">
-                <a:solidFill>
-                  <a:srgbClr val="7030A0"/>
-                </a:solidFill>
-              </a:rPr>
-              <a:t>p_norm</a:t>
-            </a:r>
-            <a:r>
-              <a:rPr lang="en-US" dirty="0" smtClean="0">
-                <a:solidFill>
-                  <a:srgbClr val="7030A0"/>
-                </a:solidFill>
-              </a:rPr>
-              <a:t>()</a:t>
-            </a:r>
-            <a:endParaRPr lang="en-US" dirty="0">
-              <a:solidFill>
-                <a:srgbClr val="7030A0"/>
-              </a:solidFill>
-            </a:endParaRPr>
-          </a:p>
-        </p:txBody>
-      </p:sp>
+              </a:endParaRPr>
+            </a:p>
+          </p:txBody>
+        </p:sp>
+      </p:grpSp>
     </p:spTree>
     <p:extLst>
       <p:ext uri="{BB962C8B-B14F-4D97-AF65-F5344CB8AC3E}">

</xml_diff>